<commit_message>
Minor changes, not done yet. Moving to desktop for PRECISION
</commit_message>
<xml_diff>
--- a/PosterBoard/team38_version3.pptx
+++ b/PosterBoard/team38_version3.pptx
@@ -246,7 +246,7 @@
           <a:p>
             <a:fld id="{7395F848-6DDA-9042-95D4-0071278BB24B}" type="datetimeFigureOut">
               <a:rPr lang="en-US" smtClean="0"/>
-              <a:t>4/27/2017</a:t>
+              <a:t>4/28/2017</a:t>
             </a:fld>
             <a:endParaRPr lang="en-US"/>
           </a:p>
@@ -1394,7 +1394,7 @@
           <a:p>
             <a:fld id="{56B6BD69-149A-CD41-9E7C-E241C9398BA0}" type="datetimeFigureOut">
               <a:rPr lang="en-US" smtClean="0"/>
-              <a:t>4/27/2017</a:t>
+              <a:t>4/28/2017</a:t>
             </a:fld>
             <a:endParaRPr lang="en-US"/>
           </a:p>
@@ -1572,7 +1572,7 @@
           <a:p>
             <a:fld id="{56B6BD69-149A-CD41-9E7C-E241C9398BA0}" type="datetimeFigureOut">
               <a:rPr lang="en-US" smtClean="0"/>
-              <a:t>4/27/2017</a:t>
+              <a:t>4/28/2017</a:t>
             </a:fld>
             <a:endParaRPr lang="en-US"/>
           </a:p>
@@ -1740,7 +1740,7 @@
           <a:p>
             <a:fld id="{56B6BD69-149A-CD41-9E7C-E241C9398BA0}" type="datetimeFigureOut">
               <a:rPr lang="en-US" smtClean="0"/>
-              <a:t>4/27/2017</a:t>
+              <a:t>4/28/2017</a:t>
             </a:fld>
             <a:endParaRPr lang="en-US"/>
           </a:p>
@@ -1985,7 +1985,7 @@
           <a:p>
             <a:fld id="{56B6BD69-149A-CD41-9E7C-E241C9398BA0}" type="datetimeFigureOut">
               <a:rPr lang="en-US" smtClean="0"/>
-              <a:t>4/27/2017</a:t>
+              <a:t>4/28/2017</a:t>
             </a:fld>
             <a:endParaRPr lang="en-US"/>
           </a:p>
@@ -2270,7 +2270,7 @@
           <a:p>
             <a:fld id="{56B6BD69-149A-CD41-9E7C-E241C9398BA0}" type="datetimeFigureOut">
               <a:rPr lang="en-US" smtClean="0"/>
-              <a:t>4/27/2017</a:t>
+              <a:t>4/28/2017</a:t>
             </a:fld>
             <a:endParaRPr lang="en-US"/>
           </a:p>
@@ -2694,7 +2694,7 @@
           <a:p>
             <a:fld id="{56B6BD69-149A-CD41-9E7C-E241C9398BA0}" type="datetimeFigureOut">
               <a:rPr lang="en-US" smtClean="0"/>
-              <a:t>4/27/2017</a:t>
+              <a:t>4/28/2017</a:t>
             </a:fld>
             <a:endParaRPr lang="en-US"/>
           </a:p>
@@ -2811,7 +2811,7 @@
           <a:p>
             <a:fld id="{56B6BD69-149A-CD41-9E7C-E241C9398BA0}" type="datetimeFigureOut">
               <a:rPr lang="en-US" smtClean="0"/>
-              <a:t>4/27/2017</a:t>
+              <a:t>4/28/2017</a:t>
             </a:fld>
             <a:endParaRPr lang="en-US"/>
           </a:p>
@@ -2906,7 +2906,7 @@
           <a:p>
             <a:fld id="{56B6BD69-149A-CD41-9E7C-E241C9398BA0}" type="datetimeFigureOut">
               <a:rPr lang="en-US" smtClean="0"/>
-              <a:t>4/27/2017</a:t>
+              <a:t>4/28/2017</a:t>
             </a:fld>
             <a:endParaRPr lang="en-US"/>
           </a:p>
@@ -3181,7 +3181,7 @@
           <a:p>
             <a:fld id="{56B6BD69-149A-CD41-9E7C-E241C9398BA0}" type="datetimeFigureOut">
               <a:rPr lang="en-US" smtClean="0"/>
-              <a:t>4/27/2017</a:t>
+              <a:t>4/28/2017</a:t>
             </a:fld>
             <a:endParaRPr lang="en-US"/>
           </a:p>
@@ -3436,7 +3436,7 @@
           <a:p>
             <a:fld id="{56B6BD69-149A-CD41-9E7C-E241C9398BA0}" type="datetimeFigureOut">
               <a:rPr lang="en-US" smtClean="0"/>
-              <a:t>4/27/2017</a:t>
+              <a:t>4/28/2017</a:t>
             </a:fld>
             <a:endParaRPr lang="en-US"/>
           </a:p>
@@ -3648,7 +3648,7 @@
           <a:p>
             <a:fld id="{56B6BD69-149A-CD41-9E7C-E241C9398BA0}" type="datetimeFigureOut">
               <a:rPr lang="en-US" smtClean="0"/>
-              <a:t>4/27/2017</a:t>
+              <a:t>4/28/2017</a:t>
             </a:fld>
             <a:endParaRPr lang="en-US"/>
           </a:p>
@@ -5605,10 +5605,9 @@
           <a:p>
             <a:pPr algn="l"/>
             <a:r>
-              <a:rPr lang="en-US" sz="8000" b="1" cap="all" dirty="0" smtClean="0"/>
+              <a:rPr lang="en-US" sz="8000" b="1" cap="all" dirty="0"/>
               <a:t>Project Postal</a:t>
             </a:r>
-            <a:endParaRPr lang="en-US" sz="8000" b="1" cap="all" dirty="0"/>
           </a:p>
         </p:txBody>
       </p:sp>
@@ -5802,7 +5801,7 @@
                 <a:spcPts val="1800"/>
               </a:spcAft>
             </a:pPr>
-            <a:endParaRPr lang="en-US" sz="3600" b="1" dirty="0" smtClean="0">
+            <a:endParaRPr lang="en-US" sz="3600" b="1" dirty="0">
               <a:solidFill>
                 <a:srgbClr val="5D87A1"/>
               </a:solidFill>
@@ -5815,20 +5814,12 @@
               </a:spcAft>
             </a:pPr>
             <a:r>
-              <a:rPr lang="en-US" sz="3600" b="1" dirty="0" smtClean="0">
-                <a:solidFill>
-                  <a:srgbClr val="5D87A1"/>
-                </a:solidFill>
-              </a:rPr>
-              <a:t>IFT </a:t>
-            </a:r>
-            <a:r>
               <a:rPr lang="en-US" sz="3600" b="1" dirty="0">
                 <a:solidFill>
                   <a:srgbClr val="5D87A1"/>
                 </a:solidFill>
               </a:rPr>
-              <a:t>Goes Postal</a:t>
+              <a:t>IFT Goes Postal</a:t>
             </a:r>
           </a:p>
           <a:p>
@@ -6044,85 +6035,363 @@
                   <a:srgbClr val="F37321"/>
                 </a:solidFill>
               </a:rPr>
-              <a:t>Information </a:t>
-            </a:r>
-            <a:r>
-              <a:rPr lang="en-US" sz="5400">
+              <a:t>Information Foraging Theory </a:t>
+            </a:r>
+          </a:p>
+        </p:txBody>
+      </p:sp>
+      <p:sp>
+        <p:nvSpPr>
+          <p:cNvPr id="31" name="TextBox 30"/>
+          <p:cNvSpPr txBox="1"/>
+          <p:nvPr/>
+        </p:nvSpPr>
+        <p:spPr>
+          <a:xfrm>
+            <a:off x="34548034" y="12274618"/>
+            <a:ext cx="7827420" cy="16245842"/>
+          </a:xfrm>
+          <a:prstGeom prst="rect">
+            <a:avLst/>
+          </a:prstGeom>
+          <a:noFill/>
+        </p:spPr>
+        <p:txBody>
+          <a:bodyPr wrap="square" rtlCol="0">
+            <a:noAutofit/>
+          </a:bodyPr>
+          <a:lstStyle/>
+          <a:p>
+            <a:pPr>
+              <a:spcAft>
+                <a:spcPts val="1800"/>
+              </a:spcAft>
+            </a:pPr>
+            <a:r>
+              <a:rPr lang="en-US" sz="3600" b="1" dirty="0">
                 <a:solidFill>
                   <a:srgbClr val="F37321"/>
                 </a:solidFill>
               </a:rPr>
-              <a:t>Foraging Theory</a:t>
-            </a:r>
-            <a:r>
-              <a:rPr lang="en-US" sz="5400" dirty="0">
+              <a:t>Team Members (from left to right)</a:t>
+            </a:r>
+          </a:p>
+          <a:p>
+            <a:pPr marL="457200" indent="-457200">
+              <a:spcAft>
+                <a:spcPts val="1800"/>
+              </a:spcAft>
+              <a:buFont typeface="Arial"/>
+              <a:buChar char="•"/>
+            </a:pPr>
+            <a:r>
+              <a:rPr lang="en-US" sz="3000" dirty="0">
+                <a:solidFill>
+                  <a:schemeClr val="bg1"/>
+                </a:solidFill>
+              </a:rPr>
+              <a:t>Eric Winkler, Computer Science winkleer@oregonstate.edu</a:t>
+            </a:r>
+          </a:p>
+          <a:p>
+            <a:pPr marL="457200" indent="-457200">
+              <a:spcAft>
+                <a:spcPts val="1800"/>
+              </a:spcAft>
+              <a:buFont typeface="Arial"/>
+              <a:buChar char="•"/>
+            </a:pPr>
+            <a:r>
+              <a:rPr lang="en-US" sz="3000" dirty="0">
+                <a:solidFill>
+                  <a:schemeClr val="bg1"/>
+                </a:solidFill>
+              </a:rPr>
+              <a:t>Sam </a:t>
+            </a:r>
+            <a:r>
+              <a:rPr lang="en-US" sz="3000" dirty="0" err="1">
+                <a:solidFill>
+                  <a:schemeClr val="bg1"/>
+                </a:solidFill>
+              </a:rPr>
+              <a:t>Lichlyter</a:t>
+            </a:r>
+            <a:r>
+              <a:rPr lang="en-US" sz="3000" dirty="0">
+                <a:solidFill>
+                  <a:schemeClr val="bg1"/>
+                </a:solidFill>
+              </a:rPr>
+              <a:t>, Computer Science lichlyts@oregonstate.edu</a:t>
+            </a:r>
+          </a:p>
+          <a:p>
+            <a:pPr marL="457200" indent="-457200">
+              <a:spcAft>
+                <a:spcPts val="1800"/>
+              </a:spcAft>
+              <a:buFont typeface="Arial"/>
+              <a:buChar char="•"/>
+            </a:pPr>
+            <a:r>
+              <a:rPr lang="en-US" sz="3000" dirty="0">
+                <a:solidFill>
+                  <a:schemeClr val="bg1"/>
+                </a:solidFill>
+              </a:rPr>
+              <a:t>Cramer Smith, Computer Science smithcr@oregonstate.edu</a:t>
+            </a:r>
+          </a:p>
+          <a:p>
+            <a:pPr marL="457200" indent="-457200">
+              <a:spcAft>
+                <a:spcPts val="1800"/>
+              </a:spcAft>
+              <a:buFont typeface="Arial"/>
+              <a:buChar char="•"/>
+            </a:pPr>
+            <a:r>
+              <a:rPr lang="en-US" sz="3000" dirty="0">
+                <a:solidFill>
+                  <a:schemeClr val="bg1"/>
+                </a:solidFill>
+              </a:rPr>
+              <a:t>Zach Schneider, Computer Science schneidz@oregonstate.edu</a:t>
+            </a:r>
+          </a:p>
+          <a:p>
+            <a:pPr>
+              <a:spcAft>
+                <a:spcPts val="1800"/>
+              </a:spcAft>
+            </a:pPr>
+            <a:r>
+              <a:rPr lang="en-US" sz="3600" b="1" dirty="0">
                 <a:solidFill>
                   <a:srgbClr val="F37321"/>
                 </a:solidFill>
               </a:rPr>
-              <a:t> </a:t>
-            </a:r>
-          </a:p>
-        </p:txBody>
-      </p:sp>
-      <p:sp>
-        <p:nvSpPr>
-          <p:cNvPr id="29" name="Rectangle 28"/>
-          <p:cNvSpPr/>
-          <p:nvPr/>
-        </p:nvSpPr>
-        <p:spPr>
-          <a:xfrm>
-            <a:off x="34596322" y="5447887"/>
-            <a:ext cx="7827420" cy="6047739"/>
-          </a:xfrm>
-          <a:prstGeom prst="rect">
-            <a:avLst/>
-          </a:prstGeom>
-          <a:solidFill>
-            <a:schemeClr val="accent2">
-              <a:lumMod val="20000"/>
-              <a:lumOff val="80000"/>
-            </a:schemeClr>
-          </a:solidFill>
-          <a:ln>
-            <a:noFill/>
-          </a:ln>
-          <a:effectLst/>
-        </p:spPr>
-        <p:style>
-          <a:lnRef idx="1">
-            <a:schemeClr val="accent1"/>
-          </a:lnRef>
-          <a:fillRef idx="3">
-            <a:schemeClr val="accent1"/>
-          </a:fillRef>
-          <a:effectRef idx="2">
-            <a:schemeClr val="accent1"/>
-          </a:effectRef>
-          <a:fontRef idx="minor">
-            <a:schemeClr val="lt1"/>
-          </a:fontRef>
-        </p:style>
-        <p:txBody>
-          <a:bodyPr rtlCol="0" anchor="ctr"/>
-          <a:lstStyle/>
-          <a:p>
-            <a:pPr algn="ctr"/>
-            <a:r>
-              <a:rPr lang="en-US" dirty="0">
+              <a:t>Sponsoring Client</a:t>
+            </a:r>
+          </a:p>
+          <a:p>
+            <a:pPr marL="457200" indent="-457200">
+              <a:spcAft>
+                <a:spcPts val="1800"/>
+              </a:spcAft>
+              <a:buFont typeface="Arial" panose="020B0604020202020204" pitchFamily="34" charset="0"/>
+              <a:buChar char="•"/>
+            </a:pPr>
+            <a:r>
+              <a:rPr lang="en-US" sz="3000" dirty="0">
                 <a:solidFill>
-                  <a:schemeClr val="tx1"/>
+                  <a:schemeClr val="bg1"/>
                 </a:solidFill>
               </a:rPr>
-              <a:t>TEAM PICTURE</a:t>
-            </a:r>
-          </a:p>
-        </p:txBody>
-      </p:sp>
-      <p:sp>
-        <p:nvSpPr>
-          <p:cNvPr id="30" name="Subtitle 2"/>
+              <a:t>Christopher </a:t>
+            </a:r>
+            <a:r>
+              <a:rPr lang="en-US" sz="3000" dirty="0" err="1">
+                <a:solidFill>
+                  <a:schemeClr val="bg1"/>
+                </a:solidFill>
+              </a:rPr>
+              <a:t>Scaffidi</a:t>
+            </a:r>
+            <a:r>
+              <a:rPr lang="en-US" sz="3000" dirty="0">
+                <a:solidFill>
+                  <a:schemeClr val="bg1"/>
+                </a:solidFill>
+              </a:rPr>
+              <a:t>, Associate Professor,  Computer Science </a:t>
+            </a:r>
+            <a:br>
+              <a:rPr lang="en-US" sz="3000" dirty="0">
+                <a:solidFill>
+                  <a:schemeClr val="bg1"/>
+                </a:solidFill>
+              </a:rPr>
+            </a:br>
+            <a:r>
+              <a:rPr lang="en-US" sz="3000" dirty="0">
+                <a:solidFill>
+                  <a:schemeClr val="bg1"/>
+                </a:solidFill>
+              </a:rPr>
+              <a:t>Oregon State University scaffidc@eecs.oregonstate.edu</a:t>
+            </a:r>
+          </a:p>
+          <a:p>
+            <a:pPr>
+              <a:spcAft>
+                <a:spcPts val="1800"/>
+              </a:spcAft>
+            </a:pPr>
+            <a:r>
+              <a:rPr lang="en-US" sz="3600" b="1" dirty="0">
+                <a:solidFill>
+                  <a:srgbClr val="F37321"/>
+                </a:solidFill>
+              </a:rPr>
+              <a:t>Languages and Technologies</a:t>
+            </a:r>
+            <a:endParaRPr lang="en-US" sz="3000" dirty="0">
+              <a:solidFill>
+                <a:schemeClr val="bg1"/>
+              </a:solidFill>
+            </a:endParaRPr>
+          </a:p>
+          <a:p>
+            <a:pPr marL="457200" indent="-457200">
+              <a:spcAft>
+                <a:spcPts val="1800"/>
+              </a:spcAft>
+              <a:buFont typeface="Arial" panose="020B0604020202020204" pitchFamily="34" charset="0"/>
+              <a:buChar char="•"/>
+            </a:pPr>
+            <a:r>
+              <a:rPr lang="en-US" sz="3000" dirty="0">
+                <a:solidFill>
+                  <a:schemeClr val="bg1"/>
+                </a:solidFill>
+              </a:rPr>
+              <a:t>JavaScript</a:t>
+            </a:r>
+          </a:p>
+          <a:p>
+            <a:pPr marL="457200" indent="-457200">
+              <a:spcAft>
+                <a:spcPts val="1800"/>
+              </a:spcAft>
+              <a:buFont typeface="Arial" panose="020B0604020202020204" pitchFamily="34" charset="0"/>
+              <a:buChar char="•"/>
+            </a:pPr>
+            <a:r>
+              <a:rPr lang="en-US" sz="3000" dirty="0">
+                <a:solidFill>
+                  <a:schemeClr val="bg1"/>
+                </a:solidFill>
+              </a:rPr>
+              <a:t> TypeScript</a:t>
+            </a:r>
+          </a:p>
+          <a:p>
+            <a:pPr marL="457200" indent="-457200">
+              <a:spcAft>
+                <a:spcPts val="1800"/>
+              </a:spcAft>
+              <a:buFont typeface="Arial" panose="020B0604020202020204" pitchFamily="34" charset="0"/>
+              <a:buChar char="•"/>
+            </a:pPr>
+            <a:r>
+              <a:rPr lang="en-US" sz="3000" dirty="0" err="1">
+                <a:solidFill>
+                  <a:schemeClr val="bg1"/>
+                </a:solidFill>
+              </a:rPr>
+              <a:t>NodeJS</a:t>
+            </a:r>
+            <a:endParaRPr lang="en-US" sz="3000" dirty="0">
+              <a:solidFill>
+                <a:schemeClr val="bg1"/>
+              </a:solidFill>
+            </a:endParaRPr>
+          </a:p>
+          <a:p>
+            <a:pPr marL="457200" indent="-457200">
+              <a:spcAft>
+                <a:spcPts val="1800"/>
+              </a:spcAft>
+              <a:buFont typeface="Arial" panose="020B0604020202020204" pitchFamily="34" charset="0"/>
+              <a:buChar char="•"/>
+            </a:pPr>
+            <a:r>
+              <a:rPr lang="en-US" sz="3000" dirty="0">
+                <a:solidFill>
+                  <a:schemeClr val="bg1"/>
+                </a:solidFill>
+              </a:rPr>
+              <a:t>Electron</a:t>
+            </a:r>
+          </a:p>
+          <a:p>
+            <a:pPr marL="457200" indent="-457200">
+              <a:spcAft>
+                <a:spcPts val="1800"/>
+              </a:spcAft>
+              <a:buFont typeface="Arial" panose="020B0604020202020204" pitchFamily="34" charset="0"/>
+              <a:buChar char="•"/>
+            </a:pPr>
+            <a:r>
+              <a:rPr lang="en-US" sz="3000" dirty="0">
+                <a:solidFill>
+                  <a:schemeClr val="bg1"/>
+                </a:solidFill>
+              </a:rPr>
+              <a:t>Visual Studio Code</a:t>
+            </a:r>
+          </a:p>
+          <a:p>
+            <a:pPr>
+              <a:spcAft>
+                <a:spcPts val="1800"/>
+              </a:spcAft>
+            </a:pPr>
+            <a:r>
+              <a:rPr lang="en-US" sz="3600" b="1" dirty="0">
+                <a:solidFill>
+                  <a:srgbClr val="F37321"/>
+                </a:solidFill>
+              </a:rPr>
+              <a:t>User Testing</a:t>
+            </a:r>
+          </a:p>
+          <a:p>
+            <a:pPr marL="457200" indent="-457200">
+              <a:spcAft>
+                <a:spcPts val="1800"/>
+              </a:spcAft>
+              <a:buFont typeface="Arial" panose="020B0604020202020204" pitchFamily="34" charset="0"/>
+              <a:buChar char="•"/>
+            </a:pPr>
+            <a:r>
+              <a:rPr lang="en-US" sz="3000" dirty="0">
+                <a:solidFill>
+                  <a:schemeClr val="bg1"/>
+                </a:solidFill>
+              </a:rPr>
+              <a:t>IRB approved user testing in progress</a:t>
+            </a:r>
+          </a:p>
+          <a:p>
+            <a:pPr marL="457200" indent="-457200">
+              <a:spcAft>
+                <a:spcPts val="1800"/>
+              </a:spcAft>
+              <a:buFont typeface="Arial" panose="020B0604020202020204" pitchFamily="34" charset="0"/>
+              <a:buChar char="•"/>
+            </a:pPr>
+            <a:r>
+              <a:rPr lang="en-US" sz="3000" dirty="0">
+                <a:solidFill>
+                  <a:schemeClr val="bg1"/>
+                </a:solidFill>
+              </a:rPr>
+              <a:t>Results will determine effectiveness of Postal compared to base VS Code text editor</a:t>
+            </a:r>
+            <a:endParaRPr lang="en-US" sz="3000" b="1" dirty="0">
+              <a:solidFill>
+                <a:srgbClr val="F37321"/>
+              </a:solidFill>
+            </a:endParaRPr>
+          </a:p>
+        </p:txBody>
+      </p:sp>
+      <p:sp>
+        <p:nvSpPr>
+          <p:cNvPr id="60" name="Subtitle 2"/>
           <p:cNvSpPr txBox="1">
             <a:spLocks/>
           </p:cNvSpPr>
@@ -6130,8 +6399,8 @@
         </p:nvSpPr>
         <p:spPr>
           <a:xfrm>
-            <a:off x="34548034" y="3994969"/>
-            <a:ext cx="7827420" cy="2146611"/>
+            <a:off x="34548034" y="1923792"/>
+            <a:ext cx="7827420" cy="3505244"/>
           </a:xfrm>
           <a:prstGeom prst="rect">
             <a:avLst/>
@@ -6304,547 +6573,6 @@
                   <a:schemeClr val="bg1"/>
                 </a:solidFill>
               </a:rPr>
-              <a:t>About Team Postal</a:t>
-            </a:r>
-          </a:p>
-        </p:txBody>
-      </p:sp>
-      <p:sp>
-        <p:nvSpPr>
-          <p:cNvPr id="31" name="TextBox 30"/>
-          <p:cNvSpPr txBox="1"/>
-          <p:nvPr/>
-        </p:nvSpPr>
-        <p:spPr>
-          <a:xfrm>
-            <a:off x="34548034" y="12274618"/>
-            <a:ext cx="7827420" cy="16245842"/>
-          </a:xfrm>
-          <a:prstGeom prst="rect">
-            <a:avLst/>
-          </a:prstGeom>
-          <a:noFill/>
-        </p:spPr>
-        <p:txBody>
-          <a:bodyPr wrap="square" rtlCol="0">
-            <a:noAutofit/>
-          </a:bodyPr>
-          <a:lstStyle/>
-          <a:p>
-            <a:pPr>
-              <a:spcAft>
-                <a:spcPts val="1800"/>
-              </a:spcAft>
-            </a:pPr>
-            <a:r>
-              <a:rPr lang="en-US" sz="3600" b="1" dirty="0">
-                <a:solidFill>
-                  <a:srgbClr val="F37321"/>
-                </a:solidFill>
-              </a:rPr>
-              <a:t>Team Members (from left to right)</a:t>
-            </a:r>
-          </a:p>
-          <a:p>
-            <a:pPr marL="457200" indent="-457200">
-              <a:spcAft>
-                <a:spcPts val="1800"/>
-              </a:spcAft>
-              <a:buFont typeface="Arial"/>
-              <a:buChar char="•"/>
-            </a:pPr>
-            <a:r>
-              <a:rPr lang="en-US" sz="3000" dirty="0">
-                <a:solidFill>
-                  <a:schemeClr val="bg1"/>
-                </a:solidFill>
-              </a:rPr>
-              <a:t>Sam </a:t>
-            </a:r>
-            <a:r>
-              <a:rPr lang="en-US" sz="3000" dirty="0" err="1">
-                <a:solidFill>
-                  <a:schemeClr val="bg1"/>
-                </a:solidFill>
-              </a:rPr>
-              <a:t>Lichlyter</a:t>
-            </a:r>
-            <a:r>
-              <a:rPr lang="en-US" sz="3000" dirty="0">
-                <a:solidFill>
-                  <a:schemeClr val="bg1"/>
-                </a:solidFill>
-              </a:rPr>
-              <a:t>, Computer Science </a:t>
-            </a:r>
-            <a:r>
-              <a:rPr lang="en-US" sz="3000" dirty="0" err="1">
-                <a:solidFill>
-                  <a:schemeClr val="bg1"/>
-                </a:solidFill>
-              </a:rPr>
-              <a:t>lichlyts@oregonstate.edu</a:t>
-            </a:r>
-            <a:endParaRPr lang="en-US" sz="3000" dirty="0">
-              <a:solidFill>
-                <a:schemeClr val="bg1"/>
-              </a:solidFill>
-            </a:endParaRPr>
-          </a:p>
-          <a:p>
-            <a:pPr marL="457200" indent="-457200">
-              <a:spcAft>
-                <a:spcPts val="1800"/>
-              </a:spcAft>
-              <a:buFont typeface="Arial"/>
-              <a:buChar char="•"/>
-            </a:pPr>
-            <a:r>
-              <a:rPr lang="en-US" sz="3000" dirty="0">
-                <a:solidFill>
-                  <a:schemeClr val="bg1"/>
-                </a:solidFill>
-              </a:rPr>
-              <a:t>Zach Schneider, Computer Science schneidz@oregonstate.edu</a:t>
-            </a:r>
-          </a:p>
-          <a:p>
-            <a:pPr marL="457200" indent="-457200">
-              <a:spcAft>
-                <a:spcPts val="1800"/>
-              </a:spcAft>
-              <a:buFont typeface="Arial"/>
-              <a:buChar char="•"/>
-            </a:pPr>
-            <a:r>
-              <a:rPr lang="en-US" sz="3000" dirty="0">
-                <a:solidFill>
-                  <a:schemeClr val="bg1"/>
-                </a:solidFill>
-              </a:rPr>
-              <a:t>Cramer Smith, Computer Science smithcr@oregonstate.edu</a:t>
-            </a:r>
-          </a:p>
-          <a:p>
-            <a:pPr marL="457200" indent="-457200">
-              <a:spcAft>
-                <a:spcPts val="1800"/>
-              </a:spcAft>
-              <a:buFont typeface="Arial"/>
-              <a:buChar char="•"/>
-            </a:pPr>
-            <a:r>
-              <a:rPr lang="en-US" sz="3000" dirty="0">
-                <a:solidFill>
-                  <a:schemeClr val="bg1"/>
-                </a:solidFill>
-              </a:rPr>
-              <a:t>Eric Winkler, Computer Science winkleer@oregonstate.edu</a:t>
-            </a:r>
-          </a:p>
-          <a:p>
-            <a:pPr>
-              <a:spcAft>
-                <a:spcPts val="1800"/>
-              </a:spcAft>
-            </a:pPr>
-            <a:r>
-              <a:rPr lang="en-US" sz="3600" b="1" dirty="0">
-                <a:solidFill>
-                  <a:srgbClr val="F37321"/>
-                </a:solidFill>
-              </a:rPr>
-              <a:t>Sponsoring Client</a:t>
-            </a:r>
-          </a:p>
-          <a:p>
-            <a:pPr marL="457200" indent="-457200">
-              <a:spcAft>
-                <a:spcPts val="1800"/>
-              </a:spcAft>
-              <a:buFont typeface="Arial" panose="020B0604020202020204" pitchFamily="34" charset="0"/>
-              <a:buChar char="•"/>
-            </a:pPr>
-            <a:r>
-              <a:rPr lang="en-US" sz="3000" dirty="0">
-                <a:solidFill>
-                  <a:schemeClr val="bg1"/>
-                </a:solidFill>
-              </a:rPr>
-              <a:t>Christopher </a:t>
-            </a:r>
-            <a:r>
-              <a:rPr lang="en-US" sz="3000" dirty="0" err="1">
-                <a:solidFill>
-                  <a:schemeClr val="bg1"/>
-                </a:solidFill>
-              </a:rPr>
-              <a:t>Scaffidi</a:t>
-            </a:r>
-            <a:r>
-              <a:rPr lang="en-US" sz="3000" dirty="0">
-                <a:solidFill>
-                  <a:schemeClr val="bg1"/>
-                </a:solidFill>
-              </a:rPr>
-              <a:t>, Associate Professor,  Computer Science </a:t>
-            </a:r>
-            <a:br>
-              <a:rPr lang="en-US" sz="3000" dirty="0">
-                <a:solidFill>
-                  <a:schemeClr val="bg1"/>
-                </a:solidFill>
-              </a:rPr>
-            </a:br>
-            <a:r>
-              <a:rPr lang="en-US" sz="3000" dirty="0">
-                <a:solidFill>
-                  <a:schemeClr val="bg1"/>
-                </a:solidFill>
-              </a:rPr>
-              <a:t>Oregon State University scaffidc@eecs.oregonstate.edu</a:t>
-            </a:r>
-          </a:p>
-          <a:p>
-            <a:pPr>
-              <a:spcAft>
-                <a:spcPts val="1800"/>
-              </a:spcAft>
-            </a:pPr>
-            <a:r>
-              <a:rPr lang="en-US" sz="3600" b="1" dirty="0">
-                <a:solidFill>
-                  <a:srgbClr val="F37321"/>
-                </a:solidFill>
-              </a:rPr>
-              <a:t>Languages and Technologies</a:t>
-            </a:r>
-            <a:endParaRPr lang="en-US" sz="3000" dirty="0">
-              <a:solidFill>
-                <a:schemeClr val="bg1"/>
-              </a:solidFill>
-            </a:endParaRPr>
-          </a:p>
-          <a:p>
-            <a:pPr marL="457200" indent="-457200">
-              <a:spcAft>
-                <a:spcPts val="1800"/>
-              </a:spcAft>
-              <a:buFont typeface="Arial" panose="020B0604020202020204" pitchFamily="34" charset="0"/>
-              <a:buChar char="•"/>
-            </a:pPr>
-            <a:r>
-              <a:rPr lang="en-US" sz="3000" dirty="0">
-                <a:solidFill>
-                  <a:schemeClr val="bg1"/>
-                </a:solidFill>
-              </a:rPr>
-              <a:t>JavaScript</a:t>
-            </a:r>
-          </a:p>
-          <a:p>
-            <a:pPr marL="457200" indent="-457200">
-              <a:spcAft>
-                <a:spcPts val="1800"/>
-              </a:spcAft>
-              <a:buFont typeface="Arial" panose="020B0604020202020204" pitchFamily="34" charset="0"/>
-              <a:buChar char="•"/>
-            </a:pPr>
-            <a:r>
-              <a:rPr lang="en-US" sz="3000">
-                <a:solidFill>
-                  <a:schemeClr val="bg1"/>
-                </a:solidFill>
-              </a:rPr>
-              <a:t> TypeScript</a:t>
-            </a:r>
-            <a:endParaRPr lang="en-US" sz="3000" dirty="0">
-              <a:solidFill>
-                <a:schemeClr val="bg1"/>
-              </a:solidFill>
-            </a:endParaRPr>
-          </a:p>
-          <a:p>
-            <a:pPr marL="457200" indent="-457200">
-              <a:spcAft>
-                <a:spcPts val="1800"/>
-              </a:spcAft>
-              <a:buFont typeface="Arial" panose="020B0604020202020204" pitchFamily="34" charset="0"/>
-              <a:buChar char="•"/>
-            </a:pPr>
-            <a:r>
-              <a:rPr lang="en-US" sz="3000" dirty="0" err="1">
-                <a:solidFill>
-                  <a:schemeClr val="bg1"/>
-                </a:solidFill>
-              </a:rPr>
-              <a:t>NodeJS</a:t>
-            </a:r>
-            <a:endParaRPr lang="en-US" sz="3000" dirty="0">
-              <a:solidFill>
-                <a:schemeClr val="bg1"/>
-              </a:solidFill>
-            </a:endParaRPr>
-          </a:p>
-          <a:p>
-            <a:pPr marL="457200" indent="-457200">
-              <a:spcAft>
-                <a:spcPts val="1800"/>
-              </a:spcAft>
-              <a:buFont typeface="Arial" panose="020B0604020202020204" pitchFamily="34" charset="0"/>
-              <a:buChar char="•"/>
-            </a:pPr>
-            <a:r>
-              <a:rPr lang="en-US" sz="3000" dirty="0">
-                <a:solidFill>
-                  <a:schemeClr val="bg1"/>
-                </a:solidFill>
-              </a:rPr>
-              <a:t>Electron</a:t>
-            </a:r>
-          </a:p>
-          <a:p>
-            <a:pPr marL="457200" indent="-457200">
-              <a:spcAft>
-                <a:spcPts val="1800"/>
-              </a:spcAft>
-              <a:buFont typeface="Arial" panose="020B0604020202020204" pitchFamily="34" charset="0"/>
-              <a:buChar char="•"/>
-            </a:pPr>
-            <a:r>
-              <a:rPr lang="en-US" sz="3000">
-                <a:solidFill>
-                  <a:schemeClr val="bg1"/>
-                </a:solidFill>
-              </a:rPr>
-              <a:t> Visual </a:t>
-            </a:r>
-            <a:r>
-              <a:rPr lang="en-US" sz="3000" dirty="0">
-                <a:solidFill>
-                  <a:schemeClr val="bg1"/>
-                </a:solidFill>
-              </a:rPr>
-              <a:t>Studio Code</a:t>
-            </a:r>
-          </a:p>
-          <a:p>
-            <a:pPr>
-              <a:spcAft>
-                <a:spcPts val="1800"/>
-              </a:spcAft>
-            </a:pPr>
-            <a:r>
-              <a:rPr lang="en-US" sz="3000" dirty="0">
-                <a:solidFill>
-                  <a:schemeClr val="bg1"/>
-                </a:solidFill>
-              </a:rPr>
-              <a:t>The Postal team had some prior JavaScript experience before working on this project, but Node, </a:t>
-            </a:r>
-            <a:r>
-              <a:rPr lang="en-US" sz="3000" dirty="0" err="1">
-                <a:solidFill>
-                  <a:schemeClr val="bg1"/>
-                </a:solidFill>
-              </a:rPr>
-              <a:t>TypeScript</a:t>
-            </a:r>
-            <a:r>
-              <a:rPr lang="en-US" sz="3000" dirty="0">
-                <a:solidFill>
-                  <a:schemeClr val="bg1"/>
-                </a:solidFill>
-              </a:rPr>
-              <a:t> and writing IDE extensions were entirely new for each of us.</a:t>
-            </a:r>
-          </a:p>
-        </p:txBody>
-      </p:sp>
-      <p:sp>
-        <p:nvSpPr>
-          <p:cNvPr id="60" name="Subtitle 2"/>
-          <p:cNvSpPr txBox="1">
-            <a:spLocks/>
-          </p:cNvSpPr>
-          <p:nvPr/>
-        </p:nvSpPr>
-        <p:spPr>
-          <a:xfrm>
-            <a:off x="34548034" y="1923792"/>
-            <a:ext cx="7827420" cy="2146611"/>
-          </a:xfrm>
-          <a:prstGeom prst="rect">
-            <a:avLst/>
-          </a:prstGeom>
-        </p:spPr>
-        <p:txBody>
-          <a:bodyPr vert="horz" lIns="0" tIns="0" rIns="0" bIns="0" rtlCol="0">
-            <a:noAutofit/>
-          </a:bodyPr>
-          <a:lstStyle>
-            <a:lvl1pPr marL="0" indent="0" algn="ctr" defTabSz="2191405" rtl="0" eaLnBrk="1" latinLnBrk="0" hangingPunct="1">
-              <a:spcBef>
-                <a:spcPct val="20000"/>
-              </a:spcBef>
-              <a:buFont typeface="Arial"/>
-              <a:buNone/>
-              <a:defRPr sz="15300" kern="1200">
-                <a:solidFill>
-                  <a:schemeClr val="tx1">
-                    <a:tint val="75000"/>
-                  </a:schemeClr>
-                </a:solidFill>
-                <a:latin typeface="+mn-lt"/>
-                <a:ea typeface="+mn-ea"/>
-                <a:cs typeface="+mn-cs"/>
-              </a:defRPr>
-            </a:lvl1pPr>
-            <a:lvl2pPr marL="2191405" indent="0" algn="ctr" defTabSz="2191405" rtl="0" eaLnBrk="1" latinLnBrk="0" hangingPunct="1">
-              <a:spcBef>
-                <a:spcPct val="20000"/>
-              </a:spcBef>
-              <a:buFont typeface="Arial"/>
-              <a:buNone/>
-              <a:defRPr sz="13400" kern="1200">
-                <a:solidFill>
-                  <a:schemeClr val="tx1">
-                    <a:tint val="75000"/>
-                  </a:schemeClr>
-                </a:solidFill>
-                <a:latin typeface="+mn-lt"/>
-                <a:ea typeface="+mn-ea"/>
-                <a:cs typeface="+mn-cs"/>
-              </a:defRPr>
-            </a:lvl2pPr>
-            <a:lvl3pPr marL="4382811" indent="0" algn="ctr" defTabSz="2191405" rtl="0" eaLnBrk="1" latinLnBrk="0" hangingPunct="1">
-              <a:spcBef>
-                <a:spcPct val="20000"/>
-              </a:spcBef>
-              <a:buFont typeface="Arial"/>
-              <a:buNone/>
-              <a:defRPr sz="11500" kern="1200">
-                <a:solidFill>
-                  <a:schemeClr val="tx1">
-                    <a:tint val="75000"/>
-                  </a:schemeClr>
-                </a:solidFill>
-                <a:latin typeface="+mn-lt"/>
-                <a:ea typeface="+mn-ea"/>
-                <a:cs typeface="+mn-cs"/>
-              </a:defRPr>
-            </a:lvl3pPr>
-            <a:lvl4pPr marL="6574216" indent="0" algn="ctr" defTabSz="2191405" rtl="0" eaLnBrk="1" latinLnBrk="0" hangingPunct="1">
-              <a:spcBef>
-                <a:spcPct val="20000"/>
-              </a:spcBef>
-              <a:buFont typeface="Arial"/>
-              <a:buNone/>
-              <a:defRPr sz="9600" kern="1200">
-                <a:solidFill>
-                  <a:schemeClr val="tx1">
-                    <a:tint val="75000"/>
-                  </a:schemeClr>
-                </a:solidFill>
-                <a:latin typeface="+mn-lt"/>
-                <a:ea typeface="+mn-ea"/>
-                <a:cs typeface="+mn-cs"/>
-              </a:defRPr>
-            </a:lvl4pPr>
-            <a:lvl5pPr marL="8765621" indent="0" algn="ctr" defTabSz="2191405" rtl="0" eaLnBrk="1" latinLnBrk="0" hangingPunct="1">
-              <a:spcBef>
-                <a:spcPct val="20000"/>
-              </a:spcBef>
-              <a:buFont typeface="Arial"/>
-              <a:buNone/>
-              <a:defRPr sz="9600" kern="1200">
-                <a:solidFill>
-                  <a:schemeClr val="tx1">
-                    <a:tint val="75000"/>
-                  </a:schemeClr>
-                </a:solidFill>
-                <a:latin typeface="+mn-lt"/>
-                <a:ea typeface="+mn-ea"/>
-                <a:cs typeface="+mn-cs"/>
-              </a:defRPr>
-            </a:lvl5pPr>
-            <a:lvl6pPr marL="10957027" indent="0" algn="ctr" defTabSz="2191405" rtl="0" eaLnBrk="1" latinLnBrk="0" hangingPunct="1">
-              <a:spcBef>
-                <a:spcPct val="20000"/>
-              </a:spcBef>
-              <a:buFont typeface="Arial"/>
-              <a:buNone/>
-              <a:defRPr sz="9600" kern="1200">
-                <a:solidFill>
-                  <a:schemeClr val="tx1">
-                    <a:tint val="75000"/>
-                  </a:schemeClr>
-                </a:solidFill>
-                <a:latin typeface="+mn-lt"/>
-                <a:ea typeface="+mn-ea"/>
-                <a:cs typeface="+mn-cs"/>
-              </a:defRPr>
-            </a:lvl6pPr>
-            <a:lvl7pPr marL="13148432" indent="0" algn="ctr" defTabSz="2191405" rtl="0" eaLnBrk="1" latinLnBrk="0" hangingPunct="1">
-              <a:spcBef>
-                <a:spcPct val="20000"/>
-              </a:spcBef>
-              <a:buFont typeface="Arial"/>
-              <a:buNone/>
-              <a:defRPr sz="9600" kern="1200">
-                <a:solidFill>
-                  <a:schemeClr val="tx1">
-                    <a:tint val="75000"/>
-                  </a:schemeClr>
-                </a:solidFill>
-                <a:latin typeface="+mn-lt"/>
-                <a:ea typeface="+mn-ea"/>
-                <a:cs typeface="+mn-cs"/>
-              </a:defRPr>
-            </a:lvl7pPr>
-            <a:lvl8pPr marL="15339837" indent="0" algn="ctr" defTabSz="2191405" rtl="0" eaLnBrk="1" latinLnBrk="0" hangingPunct="1">
-              <a:spcBef>
-                <a:spcPct val="20000"/>
-              </a:spcBef>
-              <a:buFont typeface="Arial"/>
-              <a:buNone/>
-              <a:defRPr sz="9600" kern="1200">
-                <a:solidFill>
-                  <a:schemeClr val="tx1">
-                    <a:tint val="75000"/>
-                  </a:schemeClr>
-                </a:solidFill>
-                <a:latin typeface="+mn-lt"/>
-                <a:ea typeface="+mn-ea"/>
-                <a:cs typeface="+mn-cs"/>
-              </a:defRPr>
-            </a:lvl8pPr>
-            <a:lvl9pPr marL="17531243" indent="0" algn="ctr" defTabSz="2191405" rtl="0" eaLnBrk="1" latinLnBrk="0" hangingPunct="1">
-              <a:spcBef>
-                <a:spcPct val="20000"/>
-              </a:spcBef>
-              <a:buFont typeface="Arial"/>
-              <a:buNone/>
-              <a:defRPr sz="9600" kern="1200">
-                <a:solidFill>
-                  <a:schemeClr val="tx1">
-                    <a:tint val="75000"/>
-                  </a:schemeClr>
-                </a:solidFill>
-                <a:latin typeface="+mn-lt"/>
-                <a:ea typeface="+mn-ea"/>
-                <a:cs typeface="+mn-cs"/>
-              </a:defRPr>
-            </a:lvl9pPr>
-          </a:lstStyle>
-          <a:p>
-            <a:pPr algn="l"/>
-            <a:r>
-              <a:rPr lang="en-US" sz="5400" dirty="0">
-                <a:solidFill>
-                  <a:schemeClr val="bg1"/>
-                </a:solidFill>
-              </a:rPr>
               <a:t>Senior Capstone Project</a:t>
             </a:r>
           </a:p>
@@ -6858,6 +6586,25 @@
               </a:rPr>
               <a:t>CS 461/462/463</a:t>
             </a:r>
+          </a:p>
+          <a:p>
+            <a:pPr algn="l"/>
+            <a:r>
+              <a:rPr lang="en-US" sz="5400" dirty="0">
+                <a:solidFill>
+                  <a:schemeClr val="bg1"/>
+                </a:solidFill>
+              </a:rPr>
+              <a:t>About Team Postal</a:t>
+            </a:r>
+          </a:p>
+          <a:p>
+            <a:pPr algn="l"/>
+            <a:endParaRPr lang="en-US" sz="5400" dirty="0">
+              <a:solidFill>
+                <a:schemeClr val="bg1"/>
+              </a:solidFill>
+            </a:endParaRPr>
           </a:p>
         </p:txBody>
       </p:sp>
@@ -6992,29 +6739,6 @@
           </a:p>
         </p:txBody>
       </p:sp>
-      <p:pic>
-        <p:nvPicPr>
-          <p:cNvPr id="66" name="Picture 65"/>
-          <p:cNvPicPr>
-            <a:picLocks noChangeAspect="1"/>
-          </p:cNvPicPr>
-          <p:nvPr/>
-        </p:nvPicPr>
-        <p:blipFill rotWithShape="1">
-          <a:blip r:embed="rId5"/>
-          <a:srcRect l="8227" t="41935" r="6009" b="31630"/>
-          <a:stretch/>
-        </p:blipFill>
-        <p:spPr>
-          <a:xfrm>
-            <a:off x="11753248" y="19001073"/>
-            <a:ext cx="20401513" cy="4022832"/>
-          </a:xfrm>
-          <a:prstGeom prst="rect">
-            <a:avLst/>
-          </a:prstGeom>
-        </p:spPr>
-      </p:pic>
       <p:sp>
         <p:nvSpPr>
           <p:cNvPr id="67" name="TextBox 66"/>
@@ -7043,59 +6767,14 @@
               </a:spcAft>
             </a:pPr>
             <a:r>
-              <a:rPr lang="en-US" sz="3600" b="1" dirty="0">
+              <a:rPr lang="en-US" sz="3000" b="1" dirty="0">
                 <a:solidFill>
                   <a:srgbClr val="5D87A1"/>
                 </a:solidFill>
               </a:rPr>
               <a:t>Postal</a:t>
             </a:r>
-            <a:endParaRPr lang="en-US" sz="3600" b="1" dirty="0"/>
-          </a:p>
-          <a:p>
-            <a:pPr algn="just">
-              <a:spcAft>
-                <a:spcPts val="1800"/>
-              </a:spcAft>
-            </a:pPr>
-            <a:r>
-              <a:rPr lang="en-US" sz="3000" dirty="0" smtClean="0"/>
-              <a:t>Postal is a tool to visualize the structure of a codebase using Information Foraging Theory design patterns.</a:t>
-            </a:r>
-          </a:p>
-          <a:p>
-            <a:pPr algn="just">
-              <a:spcAft>
-                <a:spcPts val="1800"/>
-              </a:spcAft>
-            </a:pPr>
-            <a:r>
-              <a:rPr lang="en-US" sz="3100" dirty="0" smtClean="0"/>
-              <a:t>This </a:t>
-            </a:r>
-            <a:r>
-              <a:rPr lang="en-US" sz="3100" dirty="0"/>
-              <a:t>is displayed as a separate window that shows up alongside the users’ code that they can interact with. Files and blocks (for example: HTML div tags, C++ classes, etc.) show up as nodes and parent-child relationships are shown as edges between those nodes. There are also file links which are a different type of edge that is used to display what files are linked to each to each other, for example if a user called a stylesheet in an HTML page that is within the project directory, this would be displayed as a file link.</a:t>
-            </a:r>
-          </a:p>
-          <a:p>
-            <a:pPr algn="just">
-              <a:spcAft>
-                <a:spcPts val="1800"/>
-              </a:spcAft>
-            </a:pPr>
-            <a:r>
-              <a:rPr lang="en-US" sz="3100" dirty="0"/>
-              <a:t>Postal is an open source, cross-platform extension that has been tested on Windows 7/10, Ubuntu, and </a:t>
-            </a:r>
-            <a:r>
-              <a:rPr lang="en-US" sz="3100" dirty="0" err="1"/>
-              <a:t>MacOS</a:t>
-            </a:r>
-            <a:r>
-              <a:rPr lang="en-US" sz="3100" dirty="0" smtClean="0"/>
-              <a:t>.</a:t>
-            </a:r>
+            <a:endParaRPr lang="en-US" sz="3000" b="1" dirty="0"/>
           </a:p>
           <a:p>
             <a:pPr>
@@ -7103,7 +6782,10 @@
                 <a:spcPts val="1800"/>
               </a:spcAft>
             </a:pPr>
-            <a:endParaRPr lang="en-US" sz="3600" b="1" dirty="0" smtClean="0"/>
+            <a:r>
+              <a:rPr lang="en-US" sz="3000" dirty="0"/>
+              <a:t>Postal is a tool to visualize the structure of a codebase using Information Foraging Theory design patterns.</a:t>
+            </a:r>
           </a:p>
           <a:p>
             <a:pPr>
@@ -7111,7 +6793,10 @@
                 <a:spcPts val="1800"/>
               </a:spcAft>
             </a:pPr>
-            <a:endParaRPr lang="en-US" sz="3600" b="1" dirty="0"/>
+            <a:r>
+              <a:rPr lang="en-US" sz="3000" dirty="0"/>
+              <a:t>This is displayed as a separate window that shows up alongside the users’ code that they can interact with. Files and blocks (for example: HTML div tags, C++ classes, etc.) show up as nodes and parent-child relationships are shown as edges between those nodes. There are also file links which are a different type of edge that is used to display what files are linked to each to each other, for example if a user called a stylesheet in an HTML page that is within the project directory, this would be displayed as a file link.</a:t>
+            </a:r>
           </a:p>
           <a:p>
             <a:pPr>
@@ -7119,11 +6804,18 @@
                 <a:spcPts val="1800"/>
               </a:spcAft>
             </a:pPr>
-            <a:endParaRPr lang="en-US" sz="3600" b="1" dirty="0" smtClean="0">
-              <a:solidFill>
-                <a:srgbClr val="5D87A1"/>
-              </a:solidFill>
-            </a:endParaRPr>
+            <a:r>
+              <a:rPr lang="en-US" sz="3000" dirty="0"/>
+              <a:t>Postal is an open source, cross-platform extension that has been tested on Windows 7/10, Ubuntu, and </a:t>
+            </a:r>
+            <a:r>
+              <a:rPr lang="en-US" sz="3000" dirty="0" err="1"/>
+              <a:t>MacOS</a:t>
+            </a:r>
+            <a:r>
+              <a:rPr lang="en-US" sz="3000" dirty="0"/>
+              <a:t>.</a:t>
+            </a:r>
           </a:p>
           <a:p>
             <a:pPr>
@@ -7131,11 +6823,7 @@
                 <a:spcPts val="1800"/>
               </a:spcAft>
             </a:pPr>
-            <a:endParaRPr lang="en-US" sz="3600" b="1" dirty="0">
-              <a:solidFill>
-                <a:srgbClr val="5D87A1"/>
-              </a:solidFill>
-            </a:endParaRPr>
+            <a:endParaRPr lang="en-US" sz="3000" b="1" dirty="0"/>
           </a:p>
           <a:p>
             <a:pPr>
@@ -7143,11 +6831,7 @@
                 <a:spcPts val="1800"/>
               </a:spcAft>
             </a:pPr>
-            <a:endParaRPr lang="en-US" sz="3600" b="1" dirty="0" smtClean="0">
-              <a:solidFill>
-                <a:srgbClr val="5D87A1"/>
-              </a:solidFill>
-            </a:endParaRPr>
+            <a:endParaRPr lang="en-US" sz="3000" b="1" dirty="0"/>
           </a:p>
           <a:p>
             <a:pPr>
@@ -7155,7 +6839,7 @@
                 <a:spcPts val="1800"/>
               </a:spcAft>
             </a:pPr>
-            <a:endParaRPr lang="en-US" sz="3600" b="1" dirty="0">
+            <a:endParaRPr lang="en-US" sz="3000" b="1" dirty="0">
               <a:solidFill>
                 <a:srgbClr val="5D87A1"/>
               </a:solidFill>
@@ -7167,7 +6851,43 @@
                 <a:spcPts val="1800"/>
               </a:spcAft>
             </a:pPr>
-            <a:endParaRPr lang="en-US" sz="3600" b="1" dirty="0" smtClean="0">
+            <a:endParaRPr lang="en-US" sz="3000" b="1" dirty="0">
+              <a:solidFill>
+                <a:srgbClr val="5D87A1"/>
+              </a:solidFill>
+            </a:endParaRPr>
+          </a:p>
+          <a:p>
+            <a:pPr>
+              <a:spcAft>
+                <a:spcPts val="1800"/>
+              </a:spcAft>
+            </a:pPr>
+            <a:endParaRPr lang="en-US" sz="3000" b="1" dirty="0">
+              <a:solidFill>
+                <a:srgbClr val="5D87A1"/>
+              </a:solidFill>
+            </a:endParaRPr>
+          </a:p>
+          <a:p>
+            <a:pPr>
+              <a:spcAft>
+                <a:spcPts val="1800"/>
+              </a:spcAft>
+            </a:pPr>
+            <a:endParaRPr lang="en-US" sz="3000" b="1" dirty="0">
+              <a:solidFill>
+                <a:srgbClr val="5D87A1"/>
+              </a:solidFill>
+            </a:endParaRPr>
+          </a:p>
+          <a:p>
+            <a:pPr>
+              <a:spcAft>
+                <a:spcPts val="1800"/>
+              </a:spcAft>
+            </a:pPr>
+            <a:endParaRPr lang="en-US" sz="3000" b="1" dirty="0">
               <a:solidFill>
                 <a:srgbClr val="5D87A1"/>
               </a:solidFill>
@@ -7253,12 +6973,8 @@
               </a:spcAft>
             </a:pPr>
             <a:r>
-              <a:rPr lang="en-US" sz="3200" dirty="0" smtClean="0"/>
-              <a:t>Postal </a:t>
-            </a:r>
-            <a:r>
               <a:rPr lang="en-US" sz="3200" dirty="0"/>
-              <a:t>is a configurable tool with a variety of applications. Through manipulation of </a:t>
+              <a:t>Postal is a configurable tool with a variety of applications. Through manipulation of </a:t>
             </a:r>
             <a:r>
               <a:rPr lang="en-US" sz="3200" dirty="0" err="1"/>
@@ -7271,10 +6987,9 @@
           </a:p>
           <a:p>
             <a:r>
-              <a:rPr lang="en-US" sz="3200" b="1" dirty="0" smtClean="0"/>
+              <a:rPr lang="en-US" sz="3200" b="1" dirty="0"/>
               <a:t>Website Mapping</a:t>
             </a:r>
-            <a:endParaRPr lang="en-US" sz="3200" b="1" dirty="0"/>
           </a:p>
           <a:p>
             <a:pPr algn="just">
@@ -7283,23 +6998,15 @@
               </a:spcAft>
             </a:pPr>
             <a:r>
-              <a:rPr lang="en-US" sz="3200" dirty="0" smtClean="0"/>
+              <a:rPr lang="en-US" sz="3200" dirty="0"/>
               <a:t>Postal is capable of mapping websites and displaying links between directory files and external sources.</a:t>
             </a:r>
-            <a:endParaRPr lang="en-US" sz="3200" b="1" dirty="0" smtClean="0"/>
-          </a:p>
-          <a:p>
-            <a:r>
-              <a:rPr lang="en-US" sz="3200" b="1" dirty="0" smtClean="0"/>
-              <a:t>Visualization </a:t>
-            </a:r>
+            <a:endParaRPr lang="en-US" sz="3200" b="1" dirty="0"/>
+          </a:p>
+          <a:p>
             <a:r>
               <a:rPr lang="en-US" sz="3200" b="1" dirty="0"/>
-              <a:t>of Specific Function </a:t>
-            </a:r>
-            <a:r>
-              <a:rPr lang="en-US" sz="3200" b="1" dirty="0" smtClean="0"/>
-              <a:t>Calls</a:t>
+              <a:t>Visualization of Specific Function Calls</a:t>
             </a:r>
           </a:p>
           <a:p>
@@ -7309,42 +7016,26 @@
               </a:spcAft>
             </a:pPr>
             <a:r>
-              <a:rPr lang="en-US" sz="3200" dirty="0" smtClean="0"/>
+              <a:rPr lang="en-US" sz="3200" dirty="0"/>
               <a:t>Useful for seeing what code is used where and how frequently it is used. </a:t>
             </a:r>
           </a:p>
           <a:p>
             <a:r>
-              <a:rPr lang="en-US" sz="3200" b="1" dirty="0" smtClean="0"/>
-              <a:t>Project </a:t>
-            </a:r>
-            <a:r>
               <a:rPr lang="en-US" sz="3200" b="1" dirty="0"/>
-              <a:t>Standards </a:t>
-            </a:r>
-            <a:r>
-              <a:rPr lang="en-US" sz="3200" b="1" dirty="0" smtClean="0"/>
-              <a:t>Enforcement</a:t>
+              <a:t>Project Standards Enforcement</a:t>
             </a:r>
           </a:p>
           <a:p>
             <a:pPr algn="just"/>
             <a:r>
-              <a:rPr lang="en-US" sz="3200" dirty="0" smtClean="0"/>
-              <a:t>Using </a:t>
-            </a:r>
-            <a:r>
               <a:rPr lang="en-US" sz="3200" dirty="0"/>
-              <a:t>the notification system, users can write grammars to find bad practices in code that might not be </a:t>
-            </a:r>
-            <a:r>
-              <a:rPr lang="en-US" sz="3200" dirty="0" smtClean="0"/>
-              <a:t>wanted.</a:t>
+              <a:t>Using the notification system, users can write grammars to find bad practices in code that might not be wanted.</a:t>
             </a:r>
           </a:p>
           <a:p>
             <a:pPr algn="just"/>
-            <a:endParaRPr lang="en-US" sz="3200" dirty="0" smtClean="0"/>
+            <a:endParaRPr lang="en-US" sz="3200" dirty="0"/>
           </a:p>
           <a:p>
             <a:pPr algn="just">
@@ -7353,28 +7044,12 @@
               </a:spcAft>
             </a:pPr>
             <a:r>
-              <a:rPr lang="en-US" sz="3600" b="1" dirty="0" smtClean="0">
-                <a:solidFill>
-                  <a:srgbClr val="5D87A1"/>
-                </a:solidFill>
-              </a:rPr>
-              <a:t>Visual </a:t>
-            </a:r>
-            <a:r>
               <a:rPr lang="en-US" sz="3600" b="1" dirty="0">
                 <a:solidFill>
                   <a:srgbClr val="5D87A1"/>
                 </a:solidFill>
               </a:rPr>
-              <a:t>Studio </a:t>
-            </a:r>
-            <a:r>
-              <a:rPr lang="en-US" sz="3600" b="1" dirty="0" smtClean="0">
-                <a:solidFill>
-                  <a:srgbClr val="5D87A1"/>
-                </a:solidFill>
-              </a:rPr>
-              <a:t>Code</a:t>
+              <a:t>Visual Studio Code</a:t>
             </a:r>
           </a:p>
           <a:p>
@@ -7413,13 +7088,9 @@
             </a:pPr>
             <a:r>
               <a:rPr lang="en-US" sz="3600" dirty="0"/>
-              <a:t>Open source, cross platform, </a:t>
-            </a:r>
-            <a:r>
-              <a:rPr lang="en-US" sz="3600" dirty="0" smtClean="0"/>
-              <a:t>free</a:t>
-            </a:r>
-            <a:endParaRPr lang="en-US" sz="3600" b="1" dirty="0" smtClean="0">
+              <a:t>Open source, cross platform, free</a:t>
+            </a:r>
+            <a:endParaRPr lang="en-US" sz="3600" b="1" dirty="0">
               <a:solidFill>
                 <a:srgbClr val="5D87A1"/>
               </a:solidFill>
@@ -7432,12 +7103,8 @@
               </a:spcAft>
             </a:pPr>
             <a:r>
-              <a:rPr lang="en-US" sz="3200" dirty="0" smtClean="0"/>
-              <a:t>Creating </a:t>
-            </a:r>
-            <a:r>
               <a:rPr lang="en-US" sz="3200" dirty="0"/>
-              <a:t>a VS Code extension allowed our team to focus on the tool itself and not have to worry about how the user would invoke our tool. It also gave us an excellent platform to which to market our extension. Having this tool up on a marketplace meant we didn’t have to distribute it ourselves and we could focus on building the tool and marketing it towards our target audiences. </a:t>
+              <a:t>Creating a VS Code extension allowed our team to focus on the tool itself and not have to worry about how the user would invoke our tool. It also gave us an excellent platform to which to market our extension. Having this tool up on a marketplace meant we didn’t have to distribute it ourselves and we could focus on building the tool and marketing it towards our target audiences. </a:t>
             </a:r>
           </a:p>
         </p:txBody>
@@ -7451,7 +7118,7 @@
           <p:nvPr/>
         </p:nvPicPr>
         <p:blipFill rotWithShape="1">
-          <a:blip r:embed="rId6">
+          <a:blip r:embed="rId5">
             <a:extLst>
               <a:ext uri="{28A0092B-C50C-407E-A947-70E740481C1C}">
                 <a14:useLocalDpi xmlns:a14="http://schemas.microsoft.com/office/drawing/2010/main" val="0"/>
@@ -7465,6 +7132,30 @@
           <a:xfrm>
             <a:off x="34551962" y="5429036"/>
             <a:ext cx="7847636" cy="6085440"/>
+          </a:xfrm>
+          <a:prstGeom prst="rect">
+            <a:avLst/>
+          </a:prstGeom>
+        </p:spPr>
+      </p:pic>
+      <p:pic>
+        <p:nvPicPr>
+          <p:cNvPr id="7" name="Picture 6"/>
+          <p:cNvPicPr>
+            <a:picLocks noChangeAspect="1"/>
+          </p:cNvPicPr>
+          <p:nvPr/>
+        </p:nvPicPr>
+        <p:blipFill>
+          <a:blip r:embed="rId6"/>
+          <a:stretch>
+            <a:fillRect/>
+          </a:stretch>
+        </p:blipFill>
+        <p:spPr>
+          <a:xfrm>
+            <a:off x="11832872" y="18829374"/>
+            <a:ext cx="20314820" cy="4278636"/>
           </a:xfrm>
           <a:prstGeom prst="rect">
             <a:avLst/>

</xml_diff>

<commit_message>
Newest and final version of posters
</commit_message>
<xml_diff>
--- a/PosterBoard/team38_version3.pptx
+++ b/PosterBoard/team38_version3.pptx
@@ -5680,7 +5680,7 @@
                   <a:srgbClr val="5D87A1"/>
                 </a:solidFill>
               </a:rPr>
-              <a:t>The Problem</a:t>
+              <a:t>PROBLEM: DEV</a:t>
             </a:r>
           </a:p>
           <a:p>
@@ -5704,9 +5704,9 @@
                   <a:srgbClr val="5D87A1"/>
                 </a:solidFill>
               </a:rPr>
-              <a:t>Information Foraging Theory</a:t>
-            </a:r>
-            <a:endParaRPr lang="en-US" sz="3000" dirty="0"/>
+              <a:t>INFORMATION FORAGING THEORY</a:t>
+            </a:r>
+            <a:endParaRPr lang="en-US" sz="3600" dirty="0"/>
           </a:p>
           <a:p>
             <a:r>
@@ -5729,7 +5729,7 @@
                   <a:srgbClr val="5D87A1"/>
                 </a:solidFill>
               </a:rPr>
-              <a:t>Information Topology</a:t>
+              <a:t>INFORMATION TOPOLOGY IN IFT</a:t>
             </a:r>
           </a:p>
           <a:p>
@@ -5819,7 +5819,7 @@
                   <a:srgbClr val="5D87A1"/>
                 </a:solidFill>
               </a:rPr>
-              <a:t>IFT Goes Postal</a:t>
+              <a:t>IFT GOES POSTAL</a:t>
             </a:r>
           </a:p>
           <a:p>
@@ -6362,8 +6362,21 @@
                   <a:schemeClr val="bg1"/>
                 </a:solidFill>
               </a:rPr>
-              <a:t>IRB approved user testing in progress</a:t>
-            </a:r>
+              <a:t>User testing </a:t>
+            </a:r>
+            <a:r>
+              <a:rPr lang="en-US" sz="3000">
+                <a:solidFill>
+                  <a:schemeClr val="bg1"/>
+                </a:solidFill>
+              </a:rPr>
+              <a:t>proposal submitted to IRB</a:t>
+            </a:r>
+            <a:endParaRPr lang="en-US" sz="3000" dirty="0">
+              <a:solidFill>
+                <a:schemeClr val="bg1"/>
+              </a:solidFill>
+            </a:endParaRPr>
           </a:p>
           <a:p>
             <a:pPr marL="457200" indent="-457200">
@@ -6399,8 +6412,8 @@
         </p:nvSpPr>
         <p:spPr>
           <a:xfrm>
-            <a:off x="34548034" y="1923792"/>
-            <a:ext cx="7827420" cy="3505244"/>
+            <a:off x="34548034" y="2176699"/>
+            <a:ext cx="7827420" cy="1863767"/>
           </a:xfrm>
           <a:prstGeom prst="rect">
             <a:avLst/>
@@ -6570,7 +6583,7 @@
             <a:r>
               <a:rPr lang="en-US" sz="5400" dirty="0">
                 <a:solidFill>
-                  <a:schemeClr val="bg1"/>
+                  <a:srgbClr val="F37321"/>
                 </a:solidFill>
               </a:rPr>
               <a:t>Senior Capstone Project</a:t>
@@ -6581,30 +6594,11 @@
             <a:r>
               <a:rPr lang="en-US" sz="5400" dirty="0">
                 <a:solidFill>
-                  <a:schemeClr val="bg1"/>
+                  <a:srgbClr val="F37321"/>
                 </a:solidFill>
               </a:rPr>
               <a:t>CS 461/462/463</a:t>
             </a:r>
-          </a:p>
-          <a:p>
-            <a:pPr algn="l"/>
-            <a:r>
-              <a:rPr lang="en-US" sz="5400" dirty="0">
-                <a:solidFill>
-                  <a:schemeClr val="bg1"/>
-                </a:solidFill>
-              </a:rPr>
-              <a:t>About Team Postal</a:t>
-            </a:r>
-          </a:p>
-          <a:p>
-            <a:pPr algn="l"/>
-            <a:endParaRPr lang="en-US" sz="5400" dirty="0">
-              <a:solidFill>
-                <a:schemeClr val="bg1"/>
-              </a:solidFill>
-            </a:endParaRPr>
           </a:p>
         </p:txBody>
       </p:sp>
@@ -6631,7 +6625,7 @@
         </p:blipFill>
         <p:spPr bwMode="auto">
           <a:xfrm>
-            <a:off x="2321711" y="21703825"/>
+            <a:off x="2321711" y="20817751"/>
             <a:ext cx="6950739" cy="5254819"/>
           </a:xfrm>
           <a:prstGeom prst="rect">
@@ -6664,7 +6658,7 @@
         </p:blipFill>
         <p:spPr>
           <a:xfrm>
-            <a:off x="19509688" y="6006629"/>
+            <a:off x="19509688" y="5208578"/>
             <a:ext cx="12638004" cy="12528268"/>
           </a:xfrm>
           <a:prstGeom prst="rect">
@@ -6767,14 +6761,14 @@
               </a:spcAft>
             </a:pPr>
             <a:r>
-              <a:rPr lang="en-US" sz="3000" b="1" dirty="0">
+              <a:rPr lang="en-US" sz="3600" b="1" dirty="0">
                 <a:solidFill>
                   <a:srgbClr val="5D87A1"/>
                 </a:solidFill>
               </a:rPr>
-              <a:t>Postal</a:t>
-            </a:r>
-            <a:endParaRPr lang="en-US" sz="3000" b="1" dirty="0"/>
+              <a:t>POSTAL</a:t>
+            </a:r>
+            <a:endParaRPr lang="en-US" sz="3600" b="1" dirty="0"/>
           </a:p>
           <a:p>
             <a:pPr>
@@ -6963,7 +6957,7 @@
                   <a:srgbClr val="5D87A1"/>
                 </a:solidFill>
               </a:rPr>
-              <a:t>Applications</a:t>
+              <a:t>APPLICATIONS</a:t>
             </a:r>
           </a:p>
           <a:p>
@@ -7049,7 +7043,7 @@
                   <a:srgbClr val="5D87A1"/>
                 </a:solidFill>
               </a:rPr>
-              <a:t>Visual Studio Code</a:t>
+              <a:t>VISUAL STUDIO CODE</a:t>
             </a:r>
           </a:p>
           <a:p>
@@ -7130,7 +7124,7 @@
         </p:blipFill>
         <p:spPr>
           <a:xfrm>
-            <a:off x="34551962" y="5429036"/>
+            <a:off x="34551962" y="5834560"/>
             <a:ext cx="7847636" cy="6085440"/>
           </a:xfrm>
           <a:prstGeom prst="rect">
@@ -7154,7 +7148,7 @@
         </p:blipFill>
         <p:spPr>
           <a:xfrm>
-            <a:off x="11832872" y="18829374"/>
+            <a:off x="11832872" y="18564089"/>
             <a:ext cx="20314820" cy="4278636"/>
           </a:xfrm>
           <a:prstGeom prst="rect">
@@ -7162,6 +7156,132 @@
           </a:prstGeom>
         </p:spPr>
       </p:pic>
+      <p:sp>
+        <p:nvSpPr>
+          <p:cNvPr id="4" name="TextBox 3"/>
+          <p:cNvSpPr txBox="1"/>
+          <p:nvPr/>
+        </p:nvSpPr>
+        <p:spPr>
+          <a:xfrm>
+            <a:off x="2321711" y="26072570"/>
+            <a:ext cx="6950739" cy="553998"/>
+          </a:xfrm>
+          <a:prstGeom prst="rect">
+            <a:avLst/>
+          </a:prstGeom>
+          <a:noFill/>
+        </p:spPr>
+        <p:txBody>
+          <a:bodyPr wrap="square" rtlCol="0">
+            <a:spAutoFit/>
+          </a:bodyPr>
+          <a:lstStyle/>
+          <a:p>
+            <a:pPr algn="ctr"/>
+            <a:r>
+              <a:rPr lang="en-US" sz="3000" dirty="0"/>
+              <a:t>Fig 1. A generic information topology.</a:t>
+            </a:r>
+          </a:p>
+        </p:txBody>
+      </p:sp>
+      <p:sp>
+        <p:nvSpPr>
+          <p:cNvPr id="61" name="TextBox 60"/>
+          <p:cNvSpPr txBox="1"/>
+          <p:nvPr/>
+        </p:nvSpPr>
+        <p:spPr>
+          <a:xfrm>
+            <a:off x="19509688" y="17698166"/>
+            <a:ext cx="12638004" cy="553998"/>
+          </a:xfrm>
+          <a:prstGeom prst="rect">
+            <a:avLst/>
+          </a:prstGeom>
+          <a:noFill/>
+        </p:spPr>
+        <p:txBody>
+          <a:bodyPr wrap="square" rtlCol="0">
+            <a:spAutoFit/>
+          </a:bodyPr>
+          <a:lstStyle/>
+          <a:p>
+            <a:pPr algn="ctr"/>
+            <a:r>
+              <a:rPr lang="en-US" sz="3000" dirty="0"/>
+              <a:t>Fig 2. A large codebase visualized in Postal as a web structure</a:t>
+            </a:r>
+          </a:p>
+        </p:txBody>
+      </p:sp>
+      <p:sp>
+        <p:nvSpPr>
+          <p:cNvPr id="63" name="TextBox 62"/>
+          <p:cNvSpPr txBox="1"/>
+          <p:nvPr/>
+        </p:nvSpPr>
+        <p:spPr>
+          <a:xfrm>
+            <a:off x="11832873" y="22841571"/>
+            <a:ext cx="20314820" cy="553998"/>
+          </a:xfrm>
+          <a:prstGeom prst="rect">
+            <a:avLst/>
+          </a:prstGeom>
+          <a:noFill/>
+        </p:spPr>
+        <p:txBody>
+          <a:bodyPr wrap="square" rtlCol="0">
+            <a:spAutoFit/>
+          </a:bodyPr>
+          <a:lstStyle/>
+          <a:p>
+            <a:pPr algn="ctr"/>
+            <a:r>
+              <a:rPr lang="en-US" sz="3000" dirty="0"/>
+              <a:t>Fig 3. The Project Postal codebase visualized in Postal as a hierarchy structure</a:t>
+            </a:r>
+          </a:p>
+        </p:txBody>
+      </p:sp>
+      <p:sp>
+        <p:nvSpPr>
+          <p:cNvPr id="5" name="TextBox 4"/>
+          <p:cNvSpPr txBox="1"/>
+          <p:nvPr/>
+        </p:nvSpPr>
+        <p:spPr>
+          <a:xfrm>
+            <a:off x="34480168" y="4851198"/>
+            <a:ext cx="7851564" cy="1754326"/>
+          </a:xfrm>
+          <a:prstGeom prst="rect">
+            <a:avLst/>
+          </a:prstGeom>
+          <a:noFill/>
+        </p:spPr>
+        <p:txBody>
+          <a:bodyPr wrap="square" rtlCol="0">
+            <a:spAutoFit/>
+          </a:bodyPr>
+          <a:lstStyle/>
+          <a:p>
+            <a:r>
+              <a:rPr lang="en-US" sz="5400" dirty="0">
+                <a:solidFill>
+                  <a:srgbClr val="F37321"/>
+                </a:solidFill>
+              </a:rPr>
+              <a:t>About Team Postal</a:t>
+            </a:r>
+          </a:p>
+          <a:p>
+            <a:endParaRPr lang="en-US" sz="5400" dirty="0"/>
+          </a:p>
+        </p:txBody>
+      </p:sp>
     </p:spTree>
     <p:extLst>
       <p:ext uri="{BB962C8B-B14F-4D97-AF65-F5344CB8AC3E}">

</xml_diff>